<commit_message>
fix some errors in NAS project
</commit_message>
<xml_diff>
--- a/session1/presentation/Networking.pptx
+++ b/session1/presentation/Networking.pptx
@@ -266,7 +266,7 @@
           <a:p>
             <a:fld id="{1139FA4A-C808-4981-8BA9-64217A6CCEA7}" type="datetimeFigureOut">
               <a:rPr lang="en-US" smtClean="0"/>
-              <a:t>9/1/2017</a:t>
+              <a:t>9/2/2017</a:t>
             </a:fld>
             <a:endParaRPr lang="en-US"/>
           </a:p>
@@ -434,7 +434,7 @@
           <a:p>
             <a:fld id="{1139FA4A-C808-4981-8BA9-64217A6CCEA7}" type="datetimeFigureOut">
               <a:rPr lang="en-US" smtClean="0"/>
-              <a:t>9/1/2017</a:t>
+              <a:t>9/2/2017</a:t>
             </a:fld>
             <a:endParaRPr lang="en-US"/>
           </a:p>
@@ -612,7 +612,7 @@
           <a:p>
             <a:fld id="{1139FA4A-C808-4981-8BA9-64217A6CCEA7}" type="datetimeFigureOut">
               <a:rPr lang="en-US" smtClean="0"/>
-              <a:t>9/1/2017</a:t>
+              <a:t>9/2/2017</a:t>
             </a:fld>
             <a:endParaRPr lang="en-US"/>
           </a:p>
@@ -780,7 +780,7 @@
           <a:p>
             <a:fld id="{1139FA4A-C808-4981-8BA9-64217A6CCEA7}" type="datetimeFigureOut">
               <a:rPr lang="en-US" smtClean="0"/>
-              <a:t>9/1/2017</a:t>
+              <a:t>9/2/2017</a:t>
             </a:fld>
             <a:endParaRPr lang="en-US"/>
           </a:p>
@@ -1025,7 +1025,7 @@
           <a:p>
             <a:fld id="{1139FA4A-C808-4981-8BA9-64217A6CCEA7}" type="datetimeFigureOut">
               <a:rPr lang="en-US" smtClean="0"/>
-              <a:t>9/1/2017</a:t>
+              <a:t>9/2/2017</a:t>
             </a:fld>
             <a:endParaRPr lang="en-US"/>
           </a:p>
@@ -1254,7 +1254,7 @@
           <a:p>
             <a:fld id="{1139FA4A-C808-4981-8BA9-64217A6CCEA7}" type="datetimeFigureOut">
               <a:rPr lang="en-US" smtClean="0"/>
-              <a:t>9/1/2017</a:t>
+              <a:t>9/2/2017</a:t>
             </a:fld>
             <a:endParaRPr lang="en-US"/>
           </a:p>
@@ -1618,7 +1618,7 @@
           <a:p>
             <a:fld id="{1139FA4A-C808-4981-8BA9-64217A6CCEA7}" type="datetimeFigureOut">
               <a:rPr lang="en-US" smtClean="0"/>
-              <a:t>9/1/2017</a:t>
+              <a:t>9/2/2017</a:t>
             </a:fld>
             <a:endParaRPr lang="en-US"/>
           </a:p>
@@ -1735,7 +1735,7 @@
           <a:p>
             <a:fld id="{1139FA4A-C808-4981-8BA9-64217A6CCEA7}" type="datetimeFigureOut">
               <a:rPr lang="en-US" smtClean="0"/>
-              <a:t>9/1/2017</a:t>
+              <a:t>9/2/2017</a:t>
             </a:fld>
             <a:endParaRPr lang="en-US"/>
           </a:p>
@@ -1830,7 +1830,7 @@
           <a:p>
             <a:fld id="{1139FA4A-C808-4981-8BA9-64217A6CCEA7}" type="datetimeFigureOut">
               <a:rPr lang="en-US" smtClean="0"/>
-              <a:t>9/1/2017</a:t>
+              <a:t>9/2/2017</a:t>
             </a:fld>
             <a:endParaRPr lang="en-US"/>
           </a:p>
@@ -2105,7 +2105,7 @@
           <a:p>
             <a:fld id="{1139FA4A-C808-4981-8BA9-64217A6CCEA7}" type="datetimeFigureOut">
               <a:rPr lang="en-US" smtClean="0"/>
-              <a:t>9/1/2017</a:t>
+              <a:t>9/2/2017</a:t>
             </a:fld>
             <a:endParaRPr lang="en-US"/>
           </a:p>
@@ -2357,7 +2357,7 @@
           <a:p>
             <a:fld id="{1139FA4A-C808-4981-8BA9-64217A6CCEA7}" type="datetimeFigureOut">
               <a:rPr lang="en-US" smtClean="0"/>
-              <a:t>9/1/2017</a:t>
+              <a:t>9/2/2017</a:t>
             </a:fld>
             <a:endParaRPr lang="en-US"/>
           </a:p>
@@ -2568,7 +2568,7 @@
           <a:p>
             <a:fld id="{1139FA4A-C808-4981-8BA9-64217A6CCEA7}" type="datetimeFigureOut">
               <a:rPr lang="en-US" smtClean="0"/>
-              <a:t>9/1/2017</a:t>
+              <a:t>9/2/2017</a:t>
             </a:fld>
             <a:endParaRPr lang="en-US"/>
           </a:p>
@@ -6075,6 +6075,26 @@
                 <a:latin typeface="Consolas" panose="020B0609020204030204" pitchFamily="49" charset="0"/>
                 <a:cs typeface="Consolas" panose="020B0609020204030204" pitchFamily="49" charset="0"/>
               </a:rPr>
+              <a:t>sudo</a:t>
+            </a:r>
+            <a:r>
+              <a:rPr lang="en-US" sz="2000" b="1" i="1" dirty="0">
+                <a:solidFill>
+                  <a:srgbClr val="0070C0"/>
+                </a:solidFill>
+                <a:latin typeface="Consolas" panose="020B0609020204030204" pitchFamily="49" charset="0"/>
+                <a:cs typeface="Consolas" panose="020B0609020204030204" pitchFamily="49" charset="0"/>
+              </a:rPr>
+              <a:t> </a:t>
+            </a:r>
+            <a:r>
+              <a:rPr lang="en-US" sz="2000" b="1" i="1" dirty="0" err="1">
+                <a:solidFill>
+                  <a:srgbClr val="0070C0"/>
+                </a:solidFill>
+                <a:latin typeface="Consolas" panose="020B0609020204030204" pitchFamily="49" charset="0"/>
+                <a:cs typeface="Consolas" panose="020B0609020204030204" pitchFamily="49" charset="0"/>
+              </a:rPr>
               <a:t>mkdir</a:t>
             </a:r>
             <a:r>
@@ -6085,7 +6105,7 @@
                 <a:latin typeface="Consolas" panose="020B0609020204030204" pitchFamily="49" charset="0"/>
                 <a:cs typeface="Consolas" panose="020B0609020204030204" pitchFamily="49" charset="0"/>
               </a:rPr>
-              <a:t> /media/pi/USBHDD</a:t>
+              <a:t> /home/pi/USBHDD</a:t>
             </a:r>
           </a:p>
           <a:p>
@@ -6170,7 +6190,7 @@
                 <a:latin typeface="Consolas" panose="020B0609020204030204" pitchFamily="49" charset="0"/>
                 <a:cs typeface="Consolas" panose="020B0609020204030204" pitchFamily="49" charset="0"/>
               </a:rPr>
-              <a:t>=pi /dev/sda1 /media/pi/USBHDD</a:t>
+              <a:t>=pi /dev/sda1 /home/pi/USBHDD</a:t>
             </a:r>
           </a:p>
           <a:p>
@@ -7856,7 +7876,7 @@
                 <a:latin typeface="Consolas" panose="020B0609020204030204" pitchFamily="49" charset="0"/>
                 <a:cs typeface="Consolas" panose="020B0609020204030204" pitchFamily="49" charset="0"/>
               </a:rPr>
-              <a:t>path = /media/pi/USBHDD </a:t>
+              <a:t>path = /home/pi/USBHDD </a:t>
             </a:r>
           </a:p>
           <a:p>

</xml_diff>